<commit_message>
Updated in-class question answer
</commit_message>
<xml_diff>
--- a/Book-PPT/Chap4.pptx
+++ b/Book-PPT/Chap4.pptx
@@ -574,7 +574,7 @@
           <a:p>
             <a:fld id="{0E6BA319-05E9-49EE-8F99-CA1240CA2757}" type="datetimeFigureOut">
               <a:rPr lang="en-US" smtClean="0"/>
-              <a:t>1/18/2017</a:t>
+              <a:t>7/17/2017</a:t>
             </a:fld>
             <a:endParaRPr lang="en-US"/>
           </a:p>
@@ -778,7 +778,7 @@
           <a:p>
             <a:fld id="{0E6BA319-05E9-49EE-8F99-CA1240CA2757}" type="datetimeFigureOut">
               <a:rPr lang="en-US" smtClean="0"/>
-              <a:t>1/18/2017</a:t>
+              <a:t>7/17/2017</a:t>
             </a:fld>
             <a:endParaRPr lang="en-US"/>
           </a:p>
@@ -1541,7 +1541,7 @@
           <a:p>
             <a:fld id="{0E6BA319-05E9-49EE-8F99-CA1240CA2757}" type="datetimeFigureOut">
               <a:rPr lang="en-US" smtClean="0"/>
-              <a:t>1/18/2017</a:t>
+              <a:t>7/17/2017</a:t>
             </a:fld>
             <a:endParaRPr lang="en-US"/>
           </a:p>
@@ -1797,7 +1797,7 @@
           <a:p>
             <a:fld id="{0E6BA319-05E9-49EE-8F99-CA1240CA2757}" type="datetimeFigureOut">
               <a:rPr lang="en-US" smtClean="0"/>
-              <a:t>1/18/2017</a:t>
+              <a:t>7/17/2017</a:t>
             </a:fld>
             <a:endParaRPr lang="en-US"/>
           </a:p>
@@ -2188,7 +2188,7 @@
           <a:p>
             <a:fld id="{0E6BA319-05E9-49EE-8F99-CA1240CA2757}" type="datetimeFigureOut">
               <a:rPr lang="en-US" smtClean="0"/>
-              <a:t>1/18/2017</a:t>
+              <a:t>7/17/2017</a:t>
             </a:fld>
             <a:endParaRPr lang="en-US"/>
           </a:p>
@@ -2330,7 +2330,7 @@
           <a:p>
             <a:fld id="{0E6BA319-05E9-49EE-8F99-CA1240CA2757}" type="datetimeFigureOut">
               <a:rPr lang="en-US" smtClean="0"/>
-              <a:t>1/18/2017</a:t>
+              <a:t>7/17/2017</a:t>
             </a:fld>
             <a:endParaRPr lang="en-US"/>
           </a:p>
@@ -2449,7 +2449,7 @@
           <a:p>
             <a:fld id="{0E6BA319-05E9-49EE-8F99-CA1240CA2757}" type="datetimeFigureOut">
               <a:rPr lang="en-US" smtClean="0"/>
-              <a:t>1/18/2017</a:t>
+              <a:t>7/17/2017</a:t>
             </a:fld>
             <a:endParaRPr lang="en-US"/>
           </a:p>
@@ -2750,7 +2750,7 @@
           <a:p>
             <a:fld id="{0E6BA319-05E9-49EE-8F99-CA1240CA2757}" type="datetimeFigureOut">
               <a:rPr lang="en-US" smtClean="0"/>
-              <a:t>1/18/2017</a:t>
+              <a:t>7/17/2017</a:t>
             </a:fld>
             <a:endParaRPr lang="en-US"/>
           </a:p>
@@ -3027,7 +3027,7 @@
           <a:p>
             <a:fld id="{0E6BA319-05E9-49EE-8F99-CA1240CA2757}" type="datetimeFigureOut">
               <a:rPr lang="en-US" smtClean="0"/>
-              <a:t>1/18/2017</a:t>
+              <a:t>7/17/2017</a:t>
             </a:fld>
             <a:endParaRPr lang="en-US"/>
           </a:p>
@@ -10141,16 +10141,7 @@
                 </a:solidFill>
                 <a:sym typeface="Wingdings" panose="05000000000000000000" pitchFamily="2" charset="2"/>
               </a:rPr>
-              <a:t> </a:t>
-            </a:r>
-            <a:r>
-              <a:rPr lang="en-US" b="1" dirty="0" smtClean="0">
-                <a:solidFill>
-                  <a:srgbClr val="FF0000"/>
-                </a:solidFill>
-                <a:sym typeface="Wingdings" panose="05000000000000000000" pitchFamily="2" charset="2"/>
-              </a:rPr>
-              <a:t>1</a:t>
+              <a:t> 1</a:t>
             </a:r>
             <a:endParaRPr lang="en-US" b="1" dirty="0">
               <a:solidFill>
@@ -11955,7 +11946,15 @@
           <a:p>
             <a:r>
               <a:rPr lang="en-US" dirty="0" smtClean="0"/>
-              <a:t>What is Frame/Second?</a:t>
+              <a:t>What is </a:t>
+            </a:r>
+            <a:r>
+              <a:rPr lang="en-US" dirty="0" smtClean="0"/>
+              <a:t>the Frame/Second</a:t>
+            </a:r>
+            <a:r>
+              <a:rPr lang="en-US" dirty="0" smtClean="0"/>
+              <a:t>?</a:t>
             </a:r>
           </a:p>
           <a:p>
@@ -14113,16 +14112,29 @@
             <p:ph idx="1"/>
           </p:nvPr>
         </p:nvSpPr>
-        <p:spPr/>
+        <p:spPr>
+          <a:xfrm>
+            <a:off x="838200" y="1825625"/>
+            <a:ext cx="10912692" cy="4351338"/>
+          </a:xfrm>
+        </p:spPr>
         <p:txBody>
           <a:bodyPr>
-            <a:normAutofit/>
+            <a:normAutofit lnSpcReduction="10000"/>
           </a:bodyPr>
           <a:lstStyle/>
           <a:p>
             <a:r>
               <a:rPr lang="en-US" dirty="0" smtClean="0"/>
-              <a:t>What is Frame/Second?  </a:t>
+              <a:t>What </a:t>
+            </a:r>
+            <a:r>
+              <a:rPr lang="en-US" dirty="0" smtClean="0"/>
+              <a:t>is the </a:t>
+            </a:r>
+            <a:r>
+              <a:rPr lang="en-US" dirty="0" smtClean="0"/>
+              <a:t>Frame/Second?  </a:t>
             </a:r>
             <a:r>
               <a:rPr lang="en-US" dirty="0" smtClean="0">
@@ -14222,16 +14234,7 @@
                 </a:solidFill>
                 <a:sym typeface="Wingdings" panose="05000000000000000000" pitchFamily="2" charset="2"/>
               </a:rPr>
-              <a:t>When </a:t>
-            </a:r>
-            <a:r>
-              <a:rPr lang="en-US" dirty="0" err="1" smtClean="0">
-                <a:solidFill>
-                  <a:srgbClr val="FF0000"/>
-                </a:solidFill>
-                <a:sym typeface="Wingdings" panose="05000000000000000000" pitchFamily="2" charset="2"/>
-              </a:rPr>
-              <a:t>elapsedTime</a:t>
+              <a:t>No input/draw tied together</a:t>
             </a:r>
             <a:r>
               <a:rPr lang="en-US" dirty="0" smtClean="0">
@@ -14240,7 +14243,7 @@
                 </a:solidFill>
                 <a:sym typeface="Wingdings" panose="05000000000000000000" pitchFamily="2" charset="2"/>
               </a:rPr>
-              <a:t> is short (&lt;UPDATE_TIME_RATE)</a:t>
+              <a:t/>
             </a:r>
             <a:br>
               <a:rPr lang="en-US" dirty="0" smtClean="0">
@@ -14256,14 +14259,11 @@
             <a:pPr lvl="1"/>
             <a:r>
               <a:rPr lang="en-US" dirty="0" smtClean="0"/>
-              <a:t>Multiple draw() calls per update()</a:t>
-            </a:r>
-          </a:p>
-          <a:p>
-            <a:pPr lvl="1"/>
-            <a:r>
-              <a:rPr lang="en-US" dirty="0" smtClean="0"/>
-              <a:t>Multiple draw() calls per input()</a:t>
+              <a:t>Multiple draw() calls per update</a:t>
+            </a:r>
+            <a:r>
+              <a:rPr lang="en-US" dirty="0" smtClean="0"/>
+              <a:t>()</a:t>
             </a:r>
           </a:p>
           <a:p>
@@ -14275,7 +14275,53 @@
                 </a:solidFill>
                 <a:sym typeface="Wingdings" panose="05000000000000000000" pitchFamily="2" charset="2"/>
               </a:rPr>
-              <a:t>NO for the above two!!</a:t>
+              <a:t>Yes: when running way ahead, no need </a:t>
+            </a:r>
+            <a:r>
+              <a:rPr lang="en-US" smtClean="0">
+                <a:solidFill>
+                  <a:srgbClr val="FF0000"/>
+                </a:solidFill>
+                <a:sym typeface="Wingdings" panose="05000000000000000000" pitchFamily="2" charset="2"/>
+              </a:rPr>
+              <a:t>to update</a:t>
+            </a:r>
+            <a:br>
+              <a:rPr lang="en-US" smtClean="0">
+                <a:solidFill>
+                  <a:srgbClr val="FF0000"/>
+                </a:solidFill>
+                <a:sym typeface="Wingdings" panose="05000000000000000000" pitchFamily="2" charset="2"/>
+              </a:rPr>
+            </a:br>
+            <a:r>
+              <a:rPr lang="en-US" smtClean="0">
+                <a:solidFill>
+                  <a:srgbClr val="FF0000"/>
+                </a:solidFill>
+                <a:sym typeface="Wingdings" panose="05000000000000000000" pitchFamily="2" charset="2"/>
+              </a:rPr>
+              <a:t> </a:t>
+            </a:r>
+            <a:endParaRPr lang="en-US" dirty="0" smtClean="0"/>
+          </a:p>
+          <a:p>
+            <a:pPr lvl="1"/>
+            <a:r>
+              <a:rPr lang="en-US" dirty="0" smtClean="0"/>
+              <a:t>Multiple draw() calls per input()</a:t>
+            </a:r>
+          </a:p>
+          <a:p>
+            <a:pPr lvl="2"/>
+            <a:r>
+              <a:rPr lang="en-US" dirty="0" smtClean="0">
+                <a:solidFill>
+                  <a:srgbClr val="FF0000"/>
+                </a:solidFill>
+                <a:sym typeface="Wingdings" panose="05000000000000000000" pitchFamily="2" charset="2"/>
+              </a:rPr>
+              <a:t>NO: input/draw tied!!</a:t>
             </a:r>
             <a:endParaRPr lang="en-US" dirty="0" smtClean="0"/>
           </a:p>

</xml_diff>